<commit_message>
better show loose coupling
</commit_message>
<xml_diff>
--- a/kesw2015/img/wot-service-model.pptx
+++ b/kesw2015/img/wot-service-model.pptx
@@ -3103,8 +3103,8 @@
         </p:nvSpPr>
         <p:spPr>
           <a:xfrm>
-            <a:off x="2046722" y="2944038"/>
-            <a:ext cx="2306652" cy="1516082"/>
+            <a:off x="1804737" y="1299722"/>
+            <a:ext cx="2548637" cy="1516082"/>
           </a:xfrm>
           <a:prstGeom prst="cloud">
             <a:avLst/>
@@ -3136,16 +3136,6 @@
           <a:p>
             <a:pPr algn="ctr"/>
             <a:r>
-              <a:rPr lang="en-US" dirty="0" err="1" smtClean="0">
-                <a:solidFill>
-                  <a:schemeClr val="tx2">
-                    <a:lumMod val="75000"/>
-                  </a:schemeClr>
-                </a:solidFill>
-              </a:rPr>
-              <a:t>WoT</a:t>
-            </a:r>
-            <a:r>
               <a:rPr lang="en-US" dirty="0" smtClean="0">
                 <a:solidFill>
                   <a:schemeClr val="tx2">
@@ -3153,7 +3143,7 @@
                   </a:schemeClr>
                 </a:solidFill>
               </a:rPr>
-              <a:t>/IoT</a:t>
+              <a:t>WoT/IoT</a:t>
             </a:r>
           </a:p>
           <a:p>
@@ -3166,7 +3156,17 @@
                   </a:schemeClr>
                 </a:solidFill>
               </a:rPr>
-              <a:t>World Model</a:t>
+              <a:t>World </a:t>
+            </a:r>
+            <a:r>
+              <a:rPr lang="en-US" dirty="0" smtClean="0">
+                <a:solidFill>
+                  <a:schemeClr val="tx2">
+                    <a:lumMod val="75000"/>
+                  </a:schemeClr>
+                </a:solidFill>
+              </a:rPr>
+              <a:t>Model 1</a:t>
             </a:r>
             <a:endParaRPr lang="en-US" dirty="0">
               <a:solidFill>
@@ -3186,8 +3186,8 @@
         </p:nvSpPr>
         <p:spPr>
           <a:xfrm>
-            <a:off x="5554596" y="2944038"/>
-            <a:ext cx="2306652" cy="1516082"/>
+            <a:off x="5554596" y="1299722"/>
+            <a:ext cx="2306652" cy="3116404"/>
           </a:xfrm>
           <a:prstGeom prst="cloud">
             <a:avLst/>
@@ -3219,7 +3219,7 @@
           <a:p>
             <a:pPr algn="ctr"/>
             <a:r>
-              <a:rPr lang="en-US" dirty="0" err="1" smtClean="0">
+              <a:rPr lang="en-US" dirty="0" smtClean="0">
                 <a:solidFill>
                   <a:schemeClr val="tx2">
                     <a:lumMod val="75000"/>
@@ -3228,13 +3228,6 @@
               </a:rPr>
               <a:t>WoT</a:t>
             </a:r>
-            <a:endParaRPr lang="en-US" dirty="0" smtClean="0">
-              <a:solidFill>
-                <a:schemeClr val="tx2">
-                  <a:lumMod val="75000"/>
-                </a:schemeClr>
-              </a:solidFill>
-            </a:endParaRPr>
           </a:p>
           <a:p>
             <a:pPr algn="ctr"/>
@@ -3246,7 +3239,7 @@
                   </a:schemeClr>
                 </a:solidFill>
               </a:rPr>
-              <a:t>Applications</a:t>
+              <a:t>Application</a:t>
             </a:r>
             <a:endParaRPr lang="en-US" dirty="0">
               <a:solidFill>
@@ -3266,8 +3259,256 @@
         </p:nvSpPr>
         <p:spPr>
           <a:xfrm>
-            <a:off x="3811352" y="3096369"/>
-            <a:ext cx="2306652" cy="1036637"/>
+            <a:off x="3811352" y="1299722"/>
+            <a:ext cx="2306652" cy="713631"/>
+          </a:xfrm>
+          <a:prstGeom prst="cloud">
+            <a:avLst/>
+          </a:prstGeom>
+          <a:solidFill>
+            <a:schemeClr val="tx2">
+              <a:lumMod val="75000"/>
+              <a:alpha val="50000"/>
+            </a:schemeClr>
+          </a:solidFill>
+        </p:spPr>
+        <p:style>
+          <a:lnRef idx="1">
+            <a:schemeClr val="accent1"/>
+          </a:lnRef>
+          <a:fillRef idx="3">
+            <a:schemeClr val="accent1"/>
+          </a:fillRef>
+          <a:effectRef idx="2">
+            <a:schemeClr val="accent1"/>
+          </a:effectRef>
+          <a:fontRef idx="minor">
+            <a:schemeClr val="lt1"/>
+          </a:fontRef>
+        </p:style>
+        <p:txBody>
+          <a:bodyPr rtlCol="0" anchor="ctr"/>
+          <a:lstStyle/>
+          <a:p>
+            <a:pPr algn="ctr"/>
+            <a:r>
+              <a:rPr lang="en-US" dirty="0" smtClean="0"/>
+              <a:t>Service</a:t>
+            </a:r>
+          </a:p>
+          <a:p>
+            <a:pPr algn="ctr"/>
+            <a:r>
+              <a:rPr lang="en-US" dirty="0" smtClean="0"/>
+              <a:t>Model</a:t>
+            </a:r>
+            <a:endParaRPr lang="en-US" dirty="0"/>
+          </a:p>
+        </p:txBody>
+      </p:sp>
+      <p:sp>
+        <p:nvSpPr>
+          <p:cNvPr id="5" name="Cloud 4"/>
+          <p:cNvSpPr/>
+          <p:nvPr/>
+        </p:nvSpPr>
+        <p:spPr>
+          <a:xfrm>
+            <a:off x="3811352" y="2102173"/>
+            <a:ext cx="2306652" cy="713631"/>
+          </a:xfrm>
+          <a:prstGeom prst="cloud">
+            <a:avLst/>
+          </a:prstGeom>
+          <a:solidFill>
+            <a:schemeClr val="tx2">
+              <a:lumMod val="75000"/>
+              <a:alpha val="50000"/>
+            </a:schemeClr>
+          </a:solidFill>
+        </p:spPr>
+        <p:style>
+          <a:lnRef idx="1">
+            <a:schemeClr val="accent1"/>
+          </a:lnRef>
+          <a:fillRef idx="3">
+            <a:schemeClr val="accent1"/>
+          </a:fillRef>
+          <a:effectRef idx="2">
+            <a:schemeClr val="accent1"/>
+          </a:effectRef>
+          <a:fontRef idx="minor">
+            <a:schemeClr val="lt1"/>
+          </a:fontRef>
+        </p:style>
+        <p:txBody>
+          <a:bodyPr rtlCol="0" anchor="ctr"/>
+          <a:lstStyle/>
+          <a:p>
+            <a:pPr algn="ctr"/>
+            <a:r>
+              <a:rPr lang="en-US" dirty="0" smtClean="0"/>
+              <a:t>Service</a:t>
+            </a:r>
+          </a:p>
+          <a:p>
+            <a:pPr algn="ctr"/>
+            <a:r>
+              <a:rPr lang="en-US" dirty="0" smtClean="0"/>
+              <a:t>Model</a:t>
+            </a:r>
+            <a:endParaRPr lang="en-US" dirty="0"/>
+          </a:p>
+        </p:txBody>
+      </p:sp>
+      <p:sp>
+        <p:nvSpPr>
+          <p:cNvPr id="6" name="Cloud 5"/>
+          <p:cNvSpPr/>
+          <p:nvPr/>
+        </p:nvSpPr>
+        <p:spPr>
+          <a:xfrm>
+            <a:off x="1804737" y="2900043"/>
+            <a:ext cx="2548637" cy="1516082"/>
+          </a:xfrm>
+          <a:prstGeom prst="cloud">
+            <a:avLst/>
+          </a:prstGeom>
+          <a:solidFill>
+            <a:schemeClr val="tx2">
+              <a:lumMod val="40000"/>
+              <a:lumOff val="60000"/>
+            </a:schemeClr>
+          </a:solidFill>
+        </p:spPr>
+        <p:style>
+          <a:lnRef idx="1">
+            <a:schemeClr val="accent1"/>
+          </a:lnRef>
+          <a:fillRef idx="3">
+            <a:schemeClr val="accent1"/>
+          </a:fillRef>
+          <a:effectRef idx="2">
+            <a:schemeClr val="accent1"/>
+          </a:effectRef>
+          <a:fontRef idx="minor">
+            <a:schemeClr val="lt1"/>
+          </a:fontRef>
+        </p:style>
+        <p:txBody>
+          <a:bodyPr rtlCol="0" anchor="ctr"/>
+          <a:lstStyle/>
+          <a:p>
+            <a:pPr algn="ctr"/>
+            <a:r>
+              <a:rPr lang="en-US" dirty="0" smtClean="0">
+                <a:solidFill>
+                  <a:schemeClr val="tx2">
+                    <a:lumMod val="75000"/>
+                  </a:schemeClr>
+                </a:solidFill>
+              </a:rPr>
+              <a:t>WoT/IoT</a:t>
+            </a:r>
+          </a:p>
+          <a:p>
+            <a:pPr algn="ctr"/>
+            <a:r>
+              <a:rPr lang="en-US" dirty="0" smtClean="0">
+                <a:solidFill>
+                  <a:schemeClr val="tx2">
+                    <a:lumMod val="75000"/>
+                  </a:schemeClr>
+                </a:solidFill>
+              </a:rPr>
+              <a:t>World </a:t>
+            </a:r>
+            <a:r>
+              <a:rPr lang="en-US" dirty="0" smtClean="0">
+                <a:solidFill>
+                  <a:schemeClr val="tx2">
+                    <a:lumMod val="75000"/>
+                  </a:schemeClr>
+                </a:solidFill>
+              </a:rPr>
+              <a:t>Model 2</a:t>
+            </a:r>
+            <a:endParaRPr lang="en-US" dirty="0">
+              <a:solidFill>
+                <a:schemeClr val="tx2">
+                  <a:lumMod val="75000"/>
+                </a:schemeClr>
+              </a:solidFill>
+            </a:endParaRPr>
+          </a:p>
+        </p:txBody>
+      </p:sp>
+      <p:sp>
+        <p:nvSpPr>
+          <p:cNvPr id="7" name="Cloud 6"/>
+          <p:cNvSpPr/>
+          <p:nvPr/>
+        </p:nvSpPr>
+        <p:spPr>
+          <a:xfrm>
+            <a:off x="3811352" y="2900043"/>
+            <a:ext cx="2306652" cy="713631"/>
+          </a:xfrm>
+          <a:prstGeom prst="cloud">
+            <a:avLst/>
+          </a:prstGeom>
+          <a:solidFill>
+            <a:schemeClr val="tx2">
+              <a:lumMod val="75000"/>
+              <a:alpha val="50000"/>
+            </a:schemeClr>
+          </a:solidFill>
+        </p:spPr>
+        <p:style>
+          <a:lnRef idx="1">
+            <a:schemeClr val="accent1"/>
+          </a:lnRef>
+          <a:fillRef idx="3">
+            <a:schemeClr val="accent1"/>
+          </a:fillRef>
+          <a:effectRef idx="2">
+            <a:schemeClr val="accent1"/>
+          </a:effectRef>
+          <a:fontRef idx="minor">
+            <a:schemeClr val="lt1"/>
+          </a:fontRef>
+        </p:style>
+        <p:txBody>
+          <a:bodyPr rtlCol="0" anchor="ctr"/>
+          <a:lstStyle/>
+          <a:p>
+            <a:pPr algn="ctr"/>
+            <a:r>
+              <a:rPr lang="en-US" dirty="0" smtClean="0"/>
+              <a:t>Service</a:t>
+            </a:r>
+          </a:p>
+          <a:p>
+            <a:pPr algn="ctr"/>
+            <a:r>
+              <a:rPr lang="en-US" dirty="0" smtClean="0"/>
+              <a:t>Model</a:t>
+            </a:r>
+            <a:endParaRPr lang="en-US" dirty="0"/>
+          </a:p>
+        </p:txBody>
+      </p:sp>
+      <p:sp>
+        <p:nvSpPr>
+          <p:cNvPr id="8" name="Cloud 7"/>
+          <p:cNvSpPr/>
+          <p:nvPr/>
+        </p:nvSpPr>
+        <p:spPr>
+          <a:xfrm>
+            <a:off x="3811352" y="3702494"/>
+            <a:ext cx="2306652" cy="713631"/>
           </a:xfrm>
           <a:prstGeom prst="cloud">
             <a:avLst/>

</xml_diff>